<commit_message>
Logo added in our company  slide
</commit_message>
<xml_diff>
--- a/crm-pitch/i2ov0.1.pptx
+++ b/crm-pitch/i2ov0.1.pptx
@@ -47766,16 +47766,7 @@
                 </a:uFill>
                 <a:hlinkClick r:id="rId3"/>
               </a:rPr>
-              <a:t>hello@</a:t>
-            </a:r>
-            <a:r>
-              <a:rPr lang="en" dirty="0">
-                <a:uFill>
-                  <a:noFill/>
-                </a:uFill>
-                <a:hlinkClick r:id="rId3"/>
-              </a:rPr>
-              <a:t>lmnas.com</a:t>
+              <a:t>hello@lmnas.com</a:t>
             </a:r>
             <a:r>
               <a:rPr lang="en" dirty="0"/>
@@ -50174,122 +50165,6 @@
       </p:sp>
       <p:sp>
         <p:nvSpPr>
-          <p:cNvPr id="660" name="Google Shape;660;p35"/>
-          <p:cNvSpPr txBox="1">
-            <a:spLocks noGrp="1"/>
-          </p:cNvSpPr>
-          <p:nvPr>
-            <p:ph type="title"/>
-          </p:nvPr>
-        </p:nvSpPr>
-        <p:spPr>
-          <a:xfrm>
-            <a:off x="5451898" y="2913404"/>
-            <a:ext cx="2159100" cy="268500"/>
-          </a:xfrm>
-          <a:prstGeom prst="rect">
-            <a:avLst/>
-          </a:prstGeom>
-        </p:spPr>
-        <p:txBody>
-          <a:bodyPr spcFirstLastPara="1" wrap="square" lIns="91425" tIns="91425" rIns="91425" bIns="91425" anchor="b" anchorCtr="0">
-            <a:noAutofit/>
-          </a:bodyPr>
-          <a:lstStyle/>
-          <a:p>
-            <a:pPr marL="0" lvl="0" indent="0" algn="ctr" rtl="0">
-              <a:spcBef>
-                <a:spcPts val="0"/>
-              </a:spcBef>
-              <a:spcAft>
-                <a:spcPts val="0"/>
-              </a:spcAft>
-              <a:buNone/>
-            </a:pPr>
-            <a:r>
-              <a:rPr lang="en" sz="1800" b="1" u="none" dirty="0">
-                <a:solidFill>
-                  <a:schemeClr val="accent1"/>
-                </a:solidFill>
-                <a:latin typeface="Roboto"/>
-                <a:ea typeface="Roboto"/>
-                <a:cs typeface="Roboto"/>
-                <a:sym typeface="Roboto"/>
-              </a:rPr>
-              <a:t>COMPANY LOGO</a:t>
-            </a:r>
-            <a:endParaRPr sz="1800" b="1" u="none" dirty="0">
-              <a:solidFill>
-                <a:schemeClr val="accent1"/>
-              </a:solidFill>
-              <a:latin typeface="Roboto"/>
-              <a:ea typeface="Roboto"/>
-              <a:cs typeface="Roboto"/>
-              <a:sym typeface="Roboto"/>
-            </a:endParaRPr>
-          </a:p>
-        </p:txBody>
-      </p:sp>
-      <p:sp>
-        <p:nvSpPr>
-          <p:cNvPr id="661" name="Google Shape;661;p35"/>
-          <p:cNvSpPr txBox="1">
-            <a:spLocks noGrp="1"/>
-          </p:cNvSpPr>
-          <p:nvPr>
-            <p:ph type="title"/>
-          </p:nvPr>
-        </p:nvSpPr>
-        <p:spPr>
-          <a:xfrm>
-            <a:off x="5451898" y="3106076"/>
-            <a:ext cx="2159100" cy="268500"/>
-          </a:xfrm>
-          <a:prstGeom prst="rect">
-            <a:avLst/>
-          </a:prstGeom>
-        </p:spPr>
-        <p:txBody>
-          <a:bodyPr spcFirstLastPara="1" wrap="square" lIns="91425" tIns="91425" rIns="91425" bIns="91425" anchor="b" anchorCtr="0">
-            <a:noAutofit/>
-          </a:bodyPr>
-          <a:lstStyle/>
-          <a:p>
-            <a:pPr marL="0" lvl="0" indent="0" algn="ctr" rtl="0">
-              <a:spcBef>
-                <a:spcPts val="0"/>
-              </a:spcBef>
-              <a:spcAft>
-                <a:spcPts val="0"/>
-              </a:spcAft>
-              <a:buNone/>
-            </a:pPr>
-            <a:r>
-              <a:rPr lang="en" sz="1200" b="1" u="none">
-                <a:solidFill>
-                  <a:schemeClr val="accent1"/>
-                </a:solidFill>
-                <a:latin typeface="Roboto"/>
-                <a:ea typeface="Roboto"/>
-                <a:cs typeface="Roboto"/>
-                <a:sym typeface="Roboto"/>
-              </a:rPr>
-              <a:t>Your tagline here</a:t>
-            </a:r>
-            <a:endParaRPr sz="1200" b="1" u="none">
-              <a:solidFill>
-                <a:schemeClr val="accent1"/>
-              </a:solidFill>
-              <a:latin typeface="Roboto"/>
-              <a:ea typeface="Roboto"/>
-              <a:cs typeface="Roboto"/>
-              <a:sym typeface="Roboto"/>
-            </a:endParaRPr>
-          </a:p>
-        </p:txBody>
-      </p:sp>
-      <p:sp>
-        <p:nvSpPr>
           <p:cNvPr id="662" name="Google Shape;662;p35"/>
           <p:cNvSpPr txBox="1">
             <a:spLocks noGrp="1"/>
@@ -50330,343 +50205,36 @@
           </a:p>
         </p:txBody>
       </p:sp>
-      <p:sp>
-        <p:nvSpPr>
-          <p:cNvPr id="663" name="Google Shape;663;p35"/>
-          <p:cNvSpPr/>
+      <p:pic>
+        <p:nvPicPr>
+          <p:cNvPr id="17" name="Picture 16" descr="Shape&#10;&#10;Description automatically generated with medium confidence">
+            <a:extLst>
+              <a:ext uri="{FF2B5EF4-FFF2-40B4-BE49-F238E27FC236}">
+                <a16:creationId xmlns:a16="http://schemas.microsoft.com/office/drawing/2014/main" id="{8CC3C858-852A-E742-905E-DECE922B2B85}"/>
+              </a:ext>
+            </a:extLst>
+          </p:cNvPr>
+          <p:cNvPicPr>
+            <a:picLocks noChangeAspect="1"/>
+          </p:cNvPicPr>
           <p:nvPr/>
-        </p:nvSpPr>
+        </p:nvPicPr>
+        <p:blipFill>
+          <a:blip r:embed="rId3"/>
+          <a:stretch>
+            <a:fillRect/>
+          </a:stretch>
+        </p:blipFill>
         <p:spPr>
           <a:xfrm>
-            <a:off x="5976020" y="1616923"/>
-            <a:ext cx="1110892" cy="1119236"/>
+            <a:off x="5996762" y="1382233"/>
+            <a:ext cx="1132755" cy="1985733"/>
           </a:xfrm>
-          <a:custGeom>
+          <a:prstGeom prst="rect">
             <a:avLst/>
-            <a:gdLst/>
-            <a:ahLst/>
-            <a:cxnLst/>
-            <a:rect l="l" t="t" r="r" b="b"/>
-            <a:pathLst>
-              <a:path w="12697" h="12792" extrusionOk="0">
-                <a:moveTo>
-                  <a:pt x="7310" y="3435"/>
-                </a:moveTo>
-                <a:cubicBezTo>
-                  <a:pt x="7404" y="3435"/>
-                  <a:pt x="7467" y="3498"/>
-                  <a:pt x="7436" y="3624"/>
-                </a:cubicBezTo>
-                <a:cubicBezTo>
-                  <a:pt x="7310" y="3939"/>
-                  <a:pt x="7247" y="4223"/>
-                  <a:pt x="7215" y="4538"/>
-                </a:cubicBezTo>
-                <a:lnTo>
-                  <a:pt x="5419" y="4538"/>
-                </a:lnTo>
-                <a:cubicBezTo>
-                  <a:pt x="5388" y="4223"/>
-                  <a:pt x="5293" y="3908"/>
-                  <a:pt x="5199" y="3624"/>
-                </a:cubicBezTo>
-                <a:cubicBezTo>
-                  <a:pt x="5167" y="3498"/>
-                  <a:pt x="5230" y="3435"/>
-                  <a:pt x="5325" y="3435"/>
-                </a:cubicBezTo>
-                <a:close/>
-                <a:moveTo>
-                  <a:pt x="7121" y="5357"/>
-                </a:moveTo>
-                <a:cubicBezTo>
-                  <a:pt x="7089" y="6428"/>
-                  <a:pt x="7310" y="7436"/>
-                  <a:pt x="7845" y="8381"/>
-                </a:cubicBezTo>
-                <a:lnTo>
-                  <a:pt x="8003" y="8665"/>
-                </a:lnTo>
-                <a:lnTo>
-                  <a:pt x="4726" y="8665"/>
-                </a:lnTo>
-                <a:lnTo>
-                  <a:pt x="4852" y="8381"/>
-                </a:lnTo>
-                <a:cubicBezTo>
-                  <a:pt x="5356" y="7436"/>
-                  <a:pt x="5577" y="6396"/>
-                  <a:pt x="5545" y="5357"/>
-                </a:cubicBezTo>
-                <a:close/>
-                <a:moveTo>
-                  <a:pt x="8381" y="9484"/>
-                </a:moveTo>
-                <a:cubicBezTo>
-                  <a:pt x="8633" y="9484"/>
-                  <a:pt x="8790" y="9704"/>
-                  <a:pt x="8790" y="9925"/>
-                </a:cubicBezTo>
-                <a:lnTo>
-                  <a:pt x="8790" y="10335"/>
-                </a:lnTo>
-                <a:lnTo>
-                  <a:pt x="3813" y="10335"/>
-                </a:lnTo>
-                <a:lnTo>
-                  <a:pt x="3813" y="9925"/>
-                </a:lnTo>
-                <a:lnTo>
-                  <a:pt x="3844" y="9925"/>
-                </a:lnTo>
-                <a:cubicBezTo>
-                  <a:pt x="3844" y="9704"/>
-                  <a:pt x="4065" y="9484"/>
-                  <a:pt x="4254" y="9484"/>
-                </a:cubicBezTo>
-                <a:close/>
-                <a:moveTo>
-                  <a:pt x="9200" y="11154"/>
-                </a:moveTo>
-                <a:cubicBezTo>
-                  <a:pt x="9452" y="11154"/>
-                  <a:pt x="9609" y="11343"/>
-                  <a:pt x="9609" y="11595"/>
-                </a:cubicBezTo>
-                <a:lnTo>
-                  <a:pt x="9609" y="12004"/>
-                </a:lnTo>
-                <a:lnTo>
-                  <a:pt x="2993" y="12004"/>
-                </a:lnTo>
-                <a:lnTo>
-                  <a:pt x="2993" y="11595"/>
-                </a:lnTo>
-                <a:lnTo>
-                  <a:pt x="3025" y="11595"/>
-                </a:lnTo>
-                <a:cubicBezTo>
-                  <a:pt x="3025" y="11343"/>
-                  <a:pt x="3214" y="11154"/>
-                  <a:pt x="3435" y="11154"/>
-                </a:cubicBezTo>
-                <a:close/>
-                <a:moveTo>
-                  <a:pt x="6333" y="1"/>
-                </a:moveTo>
-                <a:cubicBezTo>
-                  <a:pt x="6144" y="1"/>
-                  <a:pt x="5955" y="190"/>
-                  <a:pt x="5955" y="442"/>
-                </a:cubicBezTo>
-                <a:lnTo>
-                  <a:pt x="5955" y="883"/>
-                </a:lnTo>
-                <a:lnTo>
-                  <a:pt x="5514" y="883"/>
-                </a:lnTo>
-                <a:cubicBezTo>
-                  <a:pt x="5262" y="883"/>
-                  <a:pt x="5104" y="1072"/>
-                  <a:pt x="5104" y="1261"/>
-                </a:cubicBezTo>
-                <a:cubicBezTo>
-                  <a:pt x="5104" y="1513"/>
-                  <a:pt x="5325" y="1702"/>
-                  <a:pt x="5514" y="1702"/>
-                </a:cubicBezTo>
-                <a:lnTo>
-                  <a:pt x="5955" y="1702"/>
-                </a:lnTo>
-                <a:lnTo>
-                  <a:pt x="5955" y="2521"/>
-                </a:lnTo>
-                <a:lnTo>
-                  <a:pt x="5356" y="2521"/>
-                </a:lnTo>
-                <a:cubicBezTo>
-                  <a:pt x="4695" y="2521"/>
-                  <a:pt x="4222" y="3183"/>
-                  <a:pt x="4443" y="3813"/>
-                </a:cubicBezTo>
-                <a:cubicBezTo>
-                  <a:pt x="4537" y="4034"/>
-                  <a:pt x="4569" y="4254"/>
-                  <a:pt x="4632" y="4443"/>
-                </a:cubicBezTo>
-                <a:lnTo>
-                  <a:pt x="4285" y="4443"/>
-                </a:lnTo>
-                <a:cubicBezTo>
-                  <a:pt x="4065" y="4443"/>
-                  <a:pt x="3907" y="4664"/>
-                  <a:pt x="3907" y="4884"/>
-                </a:cubicBezTo>
-                <a:cubicBezTo>
-                  <a:pt x="3907" y="5136"/>
-                  <a:pt x="4096" y="5325"/>
-                  <a:pt x="4285" y="5325"/>
-                </a:cubicBezTo>
-                <a:lnTo>
-                  <a:pt x="4726" y="5325"/>
-                </a:lnTo>
-                <a:cubicBezTo>
-                  <a:pt x="4821" y="6901"/>
-                  <a:pt x="4191" y="7846"/>
-                  <a:pt x="3718" y="8791"/>
-                </a:cubicBezTo>
-                <a:cubicBezTo>
-                  <a:pt x="3308" y="8980"/>
-                  <a:pt x="3025" y="9421"/>
-                  <a:pt x="3025" y="9893"/>
-                </a:cubicBezTo>
-                <a:lnTo>
-                  <a:pt x="3025" y="10366"/>
-                </a:lnTo>
-                <a:cubicBezTo>
-                  <a:pt x="2552" y="10524"/>
-                  <a:pt x="2206" y="10996"/>
-                  <a:pt x="2206" y="11532"/>
-                </a:cubicBezTo>
-                <a:lnTo>
-                  <a:pt x="2206" y="11973"/>
-                </a:lnTo>
-                <a:lnTo>
-                  <a:pt x="442" y="11973"/>
-                </a:lnTo>
-                <a:cubicBezTo>
-                  <a:pt x="189" y="11973"/>
-                  <a:pt x="0" y="12162"/>
-                  <a:pt x="0" y="12382"/>
-                </a:cubicBezTo>
-                <a:cubicBezTo>
-                  <a:pt x="0" y="12603"/>
-                  <a:pt x="158" y="12792"/>
-                  <a:pt x="379" y="12792"/>
-                </a:cubicBezTo>
-                <a:lnTo>
-                  <a:pt x="12256" y="12792"/>
-                </a:lnTo>
-                <a:cubicBezTo>
-                  <a:pt x="12476" y="12792"/>
-                  <a:pt x="12697" y="12603"/>
-                  <a:pt x="12697" y="12382"/>
-                </a:cubicBezTo>
-                <a:cubicBezTo>
-                  <a:pt x="12697" y="12130"/>
-                  <a:pt x="12476" y="11973"/>
-                  <a:pt x="12256" y="11973"/>
-                </a:cubicBezTo>
-                <a:lnTo>
-                  <a:pt x="10460" y="11973"/>
-                </a:lnTo>
-                <a:lnTo>
-                  <a:pt x="10460" y="11532"/>
-                </a:lnTo>
-                <a:cubicBezTo>
-                  <a:pt x="10460" y="10996"/>
-                  <a:pt x="10114" y="10555"/>
-                  <a:pt x="9641" y="10366"/>
-                </a:cubicBezTo>
-                <a:lnTo>
-                  <a:pt x="9641" y="9893"/>
-                </a:lnTo>
-                <a:cubicBezTo>
-                  <a:pt x="9641" y="9421"/>
-                  <a:pt x="9357" y="8980"/>
-                  <a:pt x="8979" y="8791"/>
-                </a:cubicBezTo>
-                <a:cubicBezTo>
-                  <a:pt x="8507" y="7877"/>
-                  <a:pt x="7877" y="6932"/>
-                  <a:pt x="7940" y="5325"/>
-                </a:cubicBezTo>
-                <a:lnTo>
-                  <a:pt x="8381" y="5325"/>
-                </a:lnTo>
-                <a:cubicBezTo>
-                  <a:pt x="8633" y="5325"/>
-                  <a:pt x="8790" y="5136"/>
-                  <a:pt x="8790" y="4884"/>
-                </a:cubicBezTo>
-                <a:cubicBezTo>
-                  <a:pt x="8790" y="4664"/>
-                  <a:pt x="8570" y="4443"/>
-                  <a:pt x="8381" y="4443"/>
-                </a:cubicBezTo>
-                <a:lnTo>
-                  <a:pt x="8034" y="4443"/>
-                </a:lnTo>
-                <a:cubicBezTo>
-                  <a:pt x="8066" y="4254"/>
-                  <a:pt x="8160" y="4034"/>
-                  <a:pt x="8223" y="3813"/>
-                </a:cubicBezTo>
-                <a:cubicBezTo>
-                  <a:pt x="8475" y="3183"/>
-                  <a:pt x="8003" y="2521"/>
-                  <a:pt x="7310" y="2521"/>
-                </a:cubicBezTo>
-                <a:lnTo>
-                  <a:pt x="6743" y="2521"/>
-                </a:lnTo>
-                <a:lnTo>
-                  <a:pt x="6743" y="1702"/>
-                </a:lnTo>
-                <a:lnTo>
-                  <a:pt x="7184" y="1702"/>
-                </a:lnTo>
-                <a:cubicBezTo>
-                  <a:pt x="7404" y="1702"/>
-                  <a:pt x="7562" y="1513"/>
-                  <a:pt x="7562" y="1261"/>
-                </a:cubicBezTo>
-                <a:cubicBezTo>
-                  <a:pt x="7562" y="1041"/>
-                  <a:pt x="7373" y="883"/>
-                  <a:pt x="7184" y="883"/>
-                </a:cubicBezTo>
-                <a:lnTo>
-                  <a:pt x="6743" y="883"/>
-                </a:lnTo>
-                <a:lnTo>
-                  <a:pt x="6743" y="442"/>
-                </a:lnTo>
-                <a:cubicBezTo>
-                  <a:pt x="6743" y="190"/>
-                  <a:pt x="6522" y="1"/>
-                  <a:pt x="6333" y="1"/>
-                </a:cubicBezTo>
-                <a:close/>
-              </a:path>
-            </a:pathLst>
-          </a:custGeom>
-          <a:solidFill>
-            <a:schemeClr val="accent1"/>
-          </a:solidFill>
-          <a:ln>
-            <a:noFill/>
-          </a:ln>
+          </a:prstGeom>
         </p:spPr>
-        <p:txBody>
-          <a:bodyPr spcFirstLastPara="1" wrap="square" lIns="91425" tIns="91425" rIns="91425" bIns="91425" anchor="ctr" anchorCtr="0">
-            <a:noAutofit/>
-          </a:bodyPr>
-          <a:lstStyle/>
-          <a:p>
-            <a:pPr marL="0" lvl="0" indent="0" algn="l" rtl="0">
-              <a:spcBef>
-                <a:spcPts val="0"/>
-              </a:spcBef>
-              <a:spcAft>
-                <a:spcPts val="0"/>
-              </a:spcAft>
-              <a:buNone/>
-            </a:pPr>
-            <a:endParaRPr/>
-          </a:p>
-        </p:txBody>
-      </p:sp>
+      </p:pic>
     </p:spTree>
   </p:cSld>
   <p:clrMapOvr>

</xml_diff>

<commit_message>
Added logo in slide 4
</commit_message>
<xml_diff>
--- a/crm-pitch/i2ov0.1.pptx
+++ b/crm-pitch/i2ov0.1.pptx
@@ -29,18 +29,18 @@
   <p:notesSz cx="6858000" cy="9144000"/>
   <p:embeddedFontLst>
     <p:embeddedFont>
-      <p:font typeface="Krona One" panose="02010605030500060004" pitchFamily="2" charset="77"/>
+      <p:font typeface="Krona One" panose="020B0604020202020204" charset="0"/>
       <p:regular r:id="rId19"/>
     </p:embeddedFont>
     <p:embeddedFont>
-      <p:font typeface="Roboto" panose="02000000000000000000" pitchFamily="2" charset="0"/>
+      <p:font typeface="Roboto" panose="020B0604020202020204" charset="0"/>
       <p:regular r:id="rId20"/>
       <p:bold r:id="rId21"/>
       <p:italic r:id="rId22"/>
       <p:boldItalic r:id="rId23"/>
     </p:embeddedFont>
     <p:embeddedFont>
-      <p:font typeface="Roboto Light" panose="02000000000000000000" pitchFamily="2" charset="0"/>
+      <p:font typeface="Roboto Light" panose="020B0604020202020204" charset="0"/>
       <p:regular r:id="rId24"/>
       <p:bold r:id="rId25"/>
       <p:italic r:id="rId26"/>
@@ -47766,16 +47766,7 @@
                 </a:uFill>
                 <a:hlinkClick r:id="rId3"/>
               </a:rPr>
-              <a:t>hello@</a:t>
-            </a:r>
-            <a:r>
-              <a:rPr lang="en" dirty="0">
-                <a:uFill>
-                  <a:noFill/>
-                </a:uFill>
-                <a:hlinkClick r:id="rId3"/>
-              </a:rPr>
-              <a:t>lmnas.com</a:t>
+              <a:t>hello@lmnas.com</a:t>
             </a:r>
             <a:r>
               <a:rPr lang="en" dirty="0"/>
@@ -50216,67 +50207,9 @@
                 <a:cs typeface="Roboto"/>
                 <a:sym typeface="Roboto"/>
               </a:rPr>
-              <a:t>COMPANY LOGO</a:t>
+              <a:t>LMNAs</a:t>
             </a:r>
             <a:endParaRPr sz="1800" b="1" u="none" dirty="0">
-              <a:solidFill>
-                <a:schemeClr val="accent1"/>
-              </a:solidFill>
-              <a:latin typeface="Roboto"/>
-              <a:ea typeface="Roboto"/>
-              <a:cs typeface="Roboto"/>
-              <a:sym typeface="Roboto"/>
-            </a:endParaRPr>
-          </a:p>
-        </p:txBody>
-      </p:sp>
-      <p:sp>
-        <p:nvSpPr>
-          <p:cNvPr id="661" name="Google Shape;661;p35"/>
-          <p:cNvSpPr txBox="1">
-            <a:spLocks noGrp="1"/>
-          </p:cNvSpPr>
-          <p:nvPr>
-            <p:ph type="title"/>
-          </p:nvPr>
-        </p:nvSpPr>
-        <p:spPr>
-          <a:xfrm>
-            <a:off x="5451898" y="3106076"/>
-            <a:ext cx="2159100" cy="268500"/>
-          </a:xfrm>
-          <a:prstGeom prst="rect">
-            <a:avLst/>
-          </a:prstGeom>
-        </p:spPr>
-        <p:txBody>
-          <a:bodyPr spcFirstLastPara="1" wrap="square" lIns="91425" tIns="91425" rIns="91425" bIns="91425" anchor="b" anchorCtr="0">
-            <a:noAutofit/>
-          </a:bodyPr>
-          <a:lstStyle/>
-          <a:p>
-            <a:pPr marL="0" lvl="0" indent="0" algn="ctr" rtl="0">
-              <a:spcBef>
-                <a:spcPts val="0"/>
-              </a:spcBef>
-              <a:spcAft>
-                <a:spcPts val="0"/>
-              </a:spcAft>
-              <a:buNone/>
-            </a:pPr>
-            <a:r>
-              <a:rPr lang="en" sz="1200" b="1" u="none">
-                <a:solidFill>
-                  <a:schemeClr val="accent1"/>
-                </a:solidFill>
-                <a:latin typeface="Roboto"/>
-                <a:ea typeface="Roboto"/>
-                <a:cs typeface="Roboto"/>
-                <a:sym typeface="Roboto"/>
-              </a:rPr>
-              <a:t>Your tagline here</a:t>
-            </a:r>
-            <a:endParaRPr sz="1200" b="1" u="none">
               <a:solidFill>
                 <a:schemeClr val="accent1"/>
               </a:solidFill>
@@ -50330,343 +50263,36 @@
           </a:p>
         </p:txBody>
       </p:sp>
-      <p:sp>
-        <p:nvSpPr>
-          <p:cNvPr id="663" name="Google Shape;663;p35"/>
-          <p:cNvSpPr/>
+      <p:pic>
+        <p:nvPicPr>
+          <p:cNvPr id="9" name="Picture 8">
+            <a:extLst>
+              <a:ext uri="{FF2B5EF4-FFF2-40B4-BE49-F238E27FC236}">
+                <a16:creationId xmlns:a16="http://schemas.microsoft.com/office/drawing/2014/main" id="{8CAD0D9C-0AD4-4905-B699-A1778A8751AC}"/>
+              </a:ext>
+            </a:extLst>
+          </p:cNvPr>
+          <p:cNvPicPr>
+            <a:picLocks noChangeAspect="1"/>
+          </p:cNvPicPr>
           <p:nvPr/>
-        </p:nvSpPr>
+        </p:nvPicPr>
+        <p:blipFill>
+          <a:blip r:embed="rId3"/>
+          <a:stretch>
+            <a:fillRect/>
+          </a:stretch>
+        </p:blipFill>
         <p:spPr>
           <a:xfrm>
-            <a:off x="5976020" y="1616923"/>
-            <a:ext cx="1110892" cy="1119236"/>
+            <a:off x="6042425" y="1746225"/>
+            <a:ext cx="875523" cy="1112477"/>
           </a:xfrm>
-          <a:custGeom>
+          <a:prstGeom prst="rect">
             <a:avLst/>
-            <a:gdLst/>
-            <a:ahLst/>
-            <a:cxnLst/>
-            <a:rect l="l" t="t" r="r" b="b"/>
-            <a:pathLst>
-              <a:path w="12697" h="12792" extrusionOk="0">
-                <a:moveTo>
-                  <a:pt x="7310" y="3435"/>
-                </a:moveTo>
-                <a:cubicBezTo>
-                  <a:pt x="7404" y="3435"/>
-                  <a:pt x="7467" y="3498"/>
-                  <a:pt x="7436" y="3624"/>
-                </a:cubicBezTo>
-                <a:cubicBezTo>
-                  <a:pt x="7310" y="3939"/>
-                  <a:pt x="7247" y="4223"/>
-                  <a:pt x="7215" y="4538"/>
-                </a:cubicBezTo>
-                <a:lnTo>
-                  <a:pt x="5419" y="4538"/>
-                </a:lnTo>
-                <a:cubicBezTo>
-                  <a:pt x="5388" y="4223"/>
-                  <a:pt x="5293" y="3908"/>
-                  <a:pt x="5199" y="3624"/>
-                </a:cubicBezTo>
-                <a:cubicBezTo>
-                  <a:pt x="5167" y="3498"/>
-                  <a:pt x="5230" y="3435"/>
-                  <a:pt x="5325" y="3435"/>
-                </a:cubicBezTo>
-                <a:close/>
-                <a:moveTo>
-                  <a:pt x="7121" y="5357"/>
-                </a:moveTo>
-                <a:cubicBezTo>
-                  <a:pt x="7089" y="6428"/>
-                  <a:pt x="7310" y="7436"/>
-                  <a:pt x="7845" y="8381"/>
-                </a:cubicBezTo>
-                <a:lnTo>
-                  <a:pt x="8003" y="8665"/>
-                </a:lnTo>
-                <a:lnTo>
-                  <a:pt x="4726" y="8665"/>
-                </a:lnTo>
-                <a:lnTo>
-                  <a:pt x="4852" y="8381"/>
-                </a:lnTo>
-                <a:cubicBezTo>
-                  <a:pt x="5356" y="7436"/>
-                  <a:pt x="5577" y="6396"/>
-                  <a:pt x="5545" y="5357"/>
-                </a:cubicBezTo>
-                <a:close/>
-                <a:moveTo>
-                  <a:pt x="8381" y="9484"/>
-                </a:moveTo>
-                <a:cubicBezTo>
-                  <a:pt x="8633" y="9484"/>
-                  <a:pt x="8790" y="9704"/>
-                  <a:pt x="8790" y="9925"/>
-                </a:cubicBezTo>
-                <a:lnTo>
-                  <a:pt x="8790" y="10335"/>
-                </a:lnTo>
-                <a:lnTo>
-                  <a:pt x="3813" y="10335"/>
-                </a:lnTo>
-                <a:lnTo>
-                  <a:pt x="3813" y="9925"/>
-                </a:lnTo>
-                <a:lnTo>
-                  <a:pt x="3844" y="9925"/>
-                </a:lnTo>
-                <a:cubicBezTo>
-                  <a:pt x="3844" y="9704"/>
-                  <a:pt x="4065" y="9484"/>
-                  <a:pt x="4254" y="9484"/>
-                </a:cubicBezTo>
-                <a:close/>
-                <a:moveTo>
-                  <a:pt x="9200" y="11154"/>
-                </a:moveTo>
-                <a:cubicBezTo>
-                  <a:pt x="9452" y="11154"/>
-                  <a:pt x="9609" y="11343"/>
-                  <a:pt x="9609" y="11595"/>
-                </a:cubicBezTo>
-                <a:lnTo>
-                  <a:pt x="9609" y="12004"/>
-                </a:lnTo>
-                <a:lnTo>
-                  <a:pt x="2993" y="12004"/>
-                </a:lnTo>
-                <a:lnTo>
-                  <a:pt x="2993" y="11595"/>
-                </a:lnTo>
-                <a:lnTo>
-                  <a:pt x="3025" y="11595"/>
-                </a:lnTo>
-                <a:cubicBezTo>
-                  <a:pt x="3025" y="11343"/>
-                  <a:pt x="3214" y="11154"/>
-                  <a:pt x="3435" y="11154"/>
-                </a:cubicBezTo>
-                <a:close/>
-                <a:moveTo>
-                  <a:pt x="6333" y="1"/>
-                </a:moveTo>
-                <a:cubicBezTo>
-                  <a:pt x="6144" y="1"/>
-                  <a:pt x="5955" y="190"/>
-                  <a:pt x="5955" y="442"/>
-                </a:cubicBezTo>
-                <a:lnTo>
-                  <a:pt x="5955" y="883"/>
-                </a:lnTo>
-                <a:lnTo>
-                  <a:pt x="5514" y="883"/>
-                </a:lnTo>
-                <a:cubicBezTo>
-                  <a:pt x="5262" y="883"/>
-                  <a:pt x="5104" y="1072"/>
-                  <a:pt x="5104" y="1261"/>
-                </a:cubicBezTo>
-                <a:cubicBezTo>
-                  <a:pt x="5104" y="1513"/>
-                  <a:pt x="5325" y="1702"/>
-                  <a:pt x="5514" y="1702"/>
-                </a:cubicBezTo>
-                <a:lnTo>
-                  <a:pt x="5955" y="1702"/>
-                </a:lnTo>
-                <a:lnTo>
-                  <a:pt x="5955" y="2521"/>
-                </a:lnTo>
-                <a:lnTo>
-                  <a:pt x="5356" y="2521"/>
-                </a:lnTo>
-                <a:cubicBezTo>
-                  <a:pt x="4695" y="2521"/>
-                  <a:pt x="4222" y="3183"/>
-                  <a:pt x="4443" y="3813"/>
-                </a:cubicBezTo>
-                <a:cubicBezTo>
-                  <a:pt x="4537" y="4034"/>
-                  <a:pt x="4569" y="4254"/>
-                  <a:pt x="4632" y="4443"/>
-                </a:cubicBezTo>
-                <a:lnTo>
-                  <a:pt x="4285" y="4443"/>
-                </a:lnTo>
-                <a:cubicBezTo>
-                  <a:pt x="4065" y="4443"/>
-                  <a:pt x="3907" y="4664"/>
-                  <a:pt x="3907" y="4884"/>
-                </a:cubicBezTo>
-                <a:cubicBezTo>
-                  <a:pt x="3907" y="5136"/>
-                  <a:pt x="4096" y="5325"/>
-                  <a:pt x="4285" y="5325"/>
-                </a:cubicBezTo>
-                <a:lnTo>
-                  <a:pt x="4726" y="5325"/>
-                </a:lnTo>
-                <a:cubicBezTo>
-                  <a:pt x="4821" y="6901"/>
-                  <a:pt x="4191" y="7846"/>
-                  <a:pt x="3718" y="8791"/>
-                </a:cubicBezTo>
-                <a:cubicBezTo>
-                  <a:pt x="3308" y="8980"/>
-                  <a:pt x="3025" y="9421"/>
-                  <a:pt x="3025" y="9893"/>
-                </a:cubicBezTo>
-                <a:lnTo>
-                  <a:pt x="3025" y="10366"/>
-                </a:lnTo>
-                <a:cubicBezTo>
-                  <a:pt x="2552" y="10524"/>
-                  <a:pt x="2206" y="10996"/>
-                  <a:pt x="2206" y="11532"/>
-                </a:cubicBezTo>
-                <a:lnTo>
-                  <a:pt x="2206" y="11973"/>
-                </a:lnTo>
-                <a:lnTo>
-                  <a:pt x="442" y="11973"/>
-                </a:lnTo>
-                <a:cubicBezTo>
-                  <a:pt x="189" y="11973"/>
-                  <a:pt x="0" y="12162"/>
-                  <a:pt x="0" y="12382"/>
-                </a:cubicBezTo>
-                <a:cubicBezTo>
-                  <a:pt x="0" y="12603"/>
-                  <a:pt x="158" y="12792"/>
-                  <a:pt x="379" y="12792"/>
-                </a:cubicBezTo>
-                <a:lnTo>
-                  <a:pt x="12256" y="12792"/>
-                </a:lnTo>
-                <a:cubicBezTo>
-                  <a:pt x="12476" y="12792"/>
-                  <a:pt x="12697" y="12603"/>
-                  <a:pt x="12697" y="12382"/>
-                </a:cubicBezTo>
-                <a:cubicBezTo>
-                  <a:pt x="12697" y="12130"/>
-                  <a:pt x="12476" y="11973"/>
-                  <a:pt x="12256" y="11973"/>
-                </a:cubicBezTo>
-                <a:lnTo>
-                  <a:pt x="10460" y="11973"/>
-                </a:lnTo>
-                <a:lnTo>
-                  <a:pt x="10460" y="11532"/>
-                </a:lnTo>
-                <a:cubicBezTo>
-                  <a:pt x="10460" y="10996"/>
-                  <a:pt x="10114" y="10555"/>
-                  <a:pt x="9641" y="10366"/>
-                </a:cubicBezTo>
-                <a:lnTo>
-                  <a:pt x="9641" y="9893"/>
-                </a:lnTo>
-                <a:cubicBezTo>
-                  <a:pt x="9641" y="9421"/>
-                  <a:pt x="9357" y="8980"/>
-                  <a:pt x="8979" y="8791"/>
-                </a:cubicBezTo>
-                <a:cubicBezTo>
-                  <a:pt x="8507" y="7877"/>
-                  <a:pt x="7877" y="6932"/>
-                  <a:pt x="7940" y="5325"/>
-                </a:cubicBezTo>
-                <a:lnTo>
-                  <a:pt x="8381" y="5325"/>
-                </a:lnTo>
-                <a:cubicBezTo>
-                  <a:pt x="8633" y="5325"/>
-                  <a:pt x="8790" y="5136"/>
-                  <a:pt x="8790" y="4884"/>
-                </a:cubicBezTo>
-                <a:cubicBezTo>
-                  <a:pt x="8790" y="4664"/>
-                  <a:pt x="8570" y="4443"/>
-                  <a:pt x="8381" y="4443"/>
-                </a:cubicBezTo>
-                <a:lnTo>
-                  <a:pt x="8034" y="4443"/>
-                </a:lnTo>
-                <a:cubicBezTo>
-                  <a:pt x="8066" y="4254"/>
-                  <a:pt x="8160" y="4034"/>
-                  <a:pt x="8223" y="3813"/>
-                </a:cubicBezTo>
-                <a:cubicBezTo>
-                  <a:pt x="8475" y="3183"/>
-                  <a:pt x="8003" y="2521"/>
-                  <a:pt x="7310" y="2521"/>
-                </a:cubicBezTo>
-                <a:lnTo>
-                  <a:pt x="6743" y="2521"/>
-                </a:lnTo>
-                <a:lnTo>
-                  <a:pt x="6743" y="1702"/>
-                </a:lnTo>
-                <a:lnTo>
-                  <a:pt x="7184" y="1702"/>
-                </a:lnTo>
-                <a:cubicBezTo>
-                  <a:pt x="7404" y="1702"/>
-                  <a:pt x="7562" y="1513"/>
-                  <a:pt x="7562" y="1261"/>
-                </a:cubicBezTo>
-                <a:cubicBezTo>
-                  <a:pt x="7562" y="1041"/>
-                  <a:pt x="7373" y="883"/>
-                  <a:pt x="7184" y="883"/>
-                </a:cubicBezTo>
-                <a:lnTo>
-                  <a:pt x="6743" y="883"/>
-                </a:lnTo>
-                <a:lnTo>
-                  <a:pt x="6743" y="442"/>
-                </a:lnTo>
-                <a:cubicBezTo>
-                  <a:pt x="6743" y="190"/>
-                  <a:pt x="6522" y="1"/>
-                  <a:pt x="6333" y="1"/>
-                </a:cubicBezTo>
-                <a:close/>
-              </a:path>
-            </a:pathLst>
-          </a:custGeom>
-          <a:solidFill>
-            <a:schemeClr val="accent1"/>
-          </a:solidFill>
-          <a:ln>
-            <a:noFill/>
-          </a:ln>
+          </a:prstGeom>
         </p:spPr>
-        <p:txBody>
-          <a:bodyPr spcFirstLastPara="1" wrap="square" lIns="91425" tIns="91425" rIns="91425" bIns="91425" anchor="ctr" anchorCtr="0">
-            <a:noAutofit/>
-          </a:bodyPr>
-          <a:lstStyle/>
-          <a:p>
-            <a:pPr marL="0" lvl="0" indent="0" algn="l" rtl="0">
-              <a:spcBef>
-                <a:spcPts val="0"/>
-              </a:spcBef>
-              <a:spcAft>
-                <a:spcPts val="0"/>
-              </a:spcAft>
-              <a:buNone/>
-            </a:pPr>
-            <a:endParaRPr/>
-          </a:p>
-        </p:txBody>
-      </p:sp>
+      </p:pic>
     </p:spTree>
   </p:cSld>
   <p:clrMapOvr>

</xml_diff>